<commit_message>
✨ feat(docs): update Development Phase 2 documentation with authentication details and remove temporary PPTX file
</commit_message>
<xml_diff>
--- a/docs/Development_Phase_2.pptx
+++ b/docs/Development_Phase_2.pptx
@@ -122,6 +122,14 @@
       </a:defRPr>
     </a:lvl9pPr>
   </p:defaultTextStyle>
+  <p:extLst>
+    <p:ext uri="{EFAFB233-063F-42B5-8137-9DF3F51BA10A}">
+      <p15:sldGuideLst xmlns:p15="http://schemas.microsoft.com/office/powerpoint/2012/main"/>
+    </p:ext>
+    <p:ext uri="{2D200454-40CA-4A62-9FC3-DE9A4176ACB9}">
+      <p15:notesGuideLst xmlns:p15="http://schemas.microsoft.com/office/powerpoint/2012/main"/>
+    </p:ext>
+  </p:extLst>
 </p:presentation>
 </file>
 
@@ -1026,7 +1034,7 @@
               <a:ea typeface="+mn-ea"/>
               <a:cs typeface="+mn-cs"/>
             </a:rPr>
-            <a:t> (optional)</a:t>
+            <a:t> </a:t>
           </a:r>
         </a:p>
         <a:p>
@@ -1141,33 +1149,6 @@
               <a:cs typeface="+mn-cs"/>
             </a:rPr>
             <a:t>SqliteStorage</a:t>
-          </a:r>
-          <a:endParaRPr lang="en-US" sz="1400" b="0" kern="1200" dirty="0">
-            <a:latin typeface="Calibri"/>
-            <a:ea typeface="+mn-ea"/>
-            <a:cs typeface="+mn-cs"/>
-          </a:endParaRPr>
-        </a:p>
-        <a:p>
-          <a:pPr marL="0" lvl="0" algn="l" defTabSz="800100">
-            <a:lnSpc>
-              <a:spcPct val="90000"/>
-            </a:lnSpc>
-            <a:spcBef>
-              <a:spcPct val="0"/>
-            </a:spcBef>
-            <a:spcAft>
-              <a:spcPct val="35000"/>
-            </a:spcAft>
-            <a:buNone/>
-          </a:pPr>
-          <a:r>
-            <a:rPr lang="en-US" sz="1400" b="0" kern="1200" dirty="0" err="1">
-              <a:latin typeface="Calibri"/>
-              <a:ea typeface="+mn-ea"/>
-              <a:cs typeface="+mn-cs"/>
-            </a:rPr>
-            <a:t>JsonStorage</a:t>
           </a:r>
           <a:endParaRPr lang="en-US" sz="1400" b="0" kern="1200" dirty="0">
             <a:latin typeface="Calibri"/>
@@ -1441,8 +1422,8 @@
       </dsp:nvSpPr>
       <dsp:spPr>
         <a:xfrm>
-          <a:off x="4378" y="760193"/>
-          <a:ext cx="1914511" cy="1458319"/>
+          <a:off x="4378" y="861154"/>
+          <a:ext cx="1914511" cy="1256398"/>
         </a:xfrm>
         <a:prstGeom prst="roundRect">
           <a:avLst>
@@ -1563,8 +1544,8 @@
         </a:p>
       </dsp:txBody>
       <dsp:txXfrm>
-        <a:off x="47091" y="802906"/>
-        <a:ext cx="1829085" cy="1372893"/>
+        <a:off x="41177" y="897953"/>
+        <a:ext cx="1840913" cy="1182800"/>
       </dsp:txXfrm>
     </dsp:sp>
     <dsp:sp modelId="{4AF0510B-34F6-49BF-A47A-74E20E2A7E02}">
@@ -1644,8 +1625,8 @@
       </dsp:nvSpPr>
       <dsp:spPr>
         <a:xfrm>
-          <a:off x="2684695" y="760193"/>
-          <a:ext cx="1914511" cy="1458319"/>
+          <a:off x="2684695" y="861154"/>
+          <a:ext cx="1914511" cy="1256398"/>
         </a:xfrm>
         <a:prstGeom prst="roundRect">
           <a:avLst>
@@ -1768,7 +1749,7 @@
               <a:ea typeface="+mn-ea"/>
               <a:cs typeface="+mn-cs"/>
             </a:rPr>
-            <a:t> (optional)</a:t>
+            <a:t> </a:t>
           </a:r>
         </a:p>
         <a:p>
@@ -1795,8 +1776,8 @@
         </a:p>
       </dsp:txBody>
       <dsp:txXfrm>
-        <a:off x="2727408" y="802906"/>
-        <a:ext cx="1829085" cy="1372893"/>
+        <a:off x="2721494" y="897953"/>
+        <a:ext cx="1840913" cy="1182800"/>
       </dsp:txXfrm>
     </dsp:sp>
     <dsp:sp modelId="{C90C0909-D885-4808-AC0A-16C07151C133}">
@@ -1876,8 +1857,8 @@
       </dsp:nvSpPr>
       <dsp:spPr>
         <a:xfrm>
-          <a:off x="5365011" y="760193"/>
-          <a:ext cx="1914511" cy="1458319"/>
+          <a:off x="5365011" y="861154"/>
+          <a:ext cx="1914511" cy="1256398"/>
         </a:xfrm>
         <a:prstGeom prst="roundRect">
           <a:avLst>
@@ -1991,37 +1972,10 @@
             <a:cs typeface="+mn-cs"/>
           </a:endParaRPr>
         </a:p>
-        <a:p>
-          <a:pPr marL="0" lvl="0" indent="0" algn="l" defTabSz="800100">
-            <a:lnSpc>
-              <a:spcPct val="90000"/>
-            </a:lnSpc>
-            <a:spcBef>
-              <a:spcPct val="0"/>
-            </a:spcBef>
-            <a:spcAft>
-              <a:spcPct val="35000"/>
-            </a:spcAft>
-            <a:buNone/>
-          </a:pPr>
-          <a:r>
-            <a:rPr lang="en-US" sz="1400" b="0" kern="1200" dirty="0" err="1">
-              <a:latin typeface="Calibri"/>
-              <a:ea typeface="+mn-ea"/>
-              <a:cs typeface="+mn-cs"/>
-            </a:rPr>
-            <a:t>JsonStorage</a:t>
-          </a:r>
-          <a:endParaRPr lang="en-US" sz="1400" b="0" kern="1200" dirty="0">
-            <a:latin typeface="Calibri"/>
-            <a:ea typeface="+mn-ea"/>
-            <a:cs typeface="+mn-cs"/>
-          </a:endParaRPr>
-        </a:p>
       </dsp:txBody>
       <dsp:txXfrm>
-        <a:off x="5407724" y="802906"/>
-        <a:ext cx="1829085" cy="1372893"/>
+        <a:off x="5401810" y="897953"/>
+        <a:ext cx="1840913" cy="1182800"/>
       </dsp:txXfrm>
     </dsp:sp>
     <dsp:sp modelId="{7D298A30-D188-400F-87CC-3591A9EF35E6}">
@@ -2101,8 +2055,8 @@
       </dsp:nvSpPr>
       <dsp:spPr>
         <a:xfrm>
-          <a:off x="8045328" y="760193"/>
-          <a:ext cx="1914511" cy="1458319"/>
+          <a:off x="8045328" y="861154"/>
+          <a:ext cx="1914511" cy="1256398"/>
         </a:xfrm>
         <a:prstGeom prst="roundRect">
           <a:avLst>
@@ -2235,8 +2189,8 @@
         </a:p>
       </dsp:txBody>
       <dsp:txXfrm>
-        <a:off x="8088041" y="802906"/>
-        <a:ext cx="1829085" cy="1372893"/>
+        <a:off x="8082127" y="897953"/>
+        <a:ext cx="1840913" cy="1182800"/>
       </dsp:txXfrm>
     </dsp:sp>
   </dsp:spTree>
@@ -3517,7 +3471,7 @@
           <a:p>
             <a:fld id="{B4086B64-2806-475F-A0FC-C80581FC7379}" type="datetimeFigureOut">
               <a:rPr lang="en-US" smtClean="0"/>
-              <a:t>12/17/2025</a:t>
+              <a:t>12/21/2025</a:t>
             </a:fld>
             <a:endParaRPr lang="en-US"/>
           </a:p>
@@ -3694,7 +3648,7 @@
           <a:p>
             <a:fld id="{1DEC01A7-C48D-4F52-9AF5-98850FAFF68B}" type="datetimeFigureOut">
               <a:rPr lang="en-US" smtClean="0"/>
-              <a:t>12/17/2025</a:t>
+              <a:t>12/21/2025</a:t>
             </a:fld>
             <a:endParaRPr lang="en-US"/>
           </a:p>
@@ -4588,7 +4542,7 @@
           <a:p>
             <a:fld id="{331BB52A-1119-4C62-AB93-D9C1ED94E901}" type="datetimeFigureOut">
               <a:rPr lang="en-US" smtClean="0"/>
-              <a:t>12/17/2025</a:t>
+              <a:t>12/21/2025</a:t>
             </a:fld>
             <a:endParaRPr lang="en-US"/>
           </a:p>
@@ -4884,7 +4838,7 @@
           <a:p>
             <a:fld id="{331BB52A-1119-4C62-AB93-D9C1ED94E901}" type="datetimeFigureOut">
               <a:rPr lang="en-US" smtClean="0"/>
-              <a:t>12/17/2025</a:t>
+              <a:t>12/21/2025</a:t>
             </a:fld>
             <a:endParaRPr lang="en-US"/>
           </a:p>
@@ -5132,7 +5086,7 @@
           <a:p>
             <a:fld id="{331BB52A-1119-4C62-AB93-D9C1ED94E901}" type="datetimeFigureOut">
               <a:rPr lang="en-US" smtClean="0"/>
-              <a:t>12/17/2025</a:t>
+              <a:t>12/21/2025</a:t>
             </a:fld>
             <a:endParaRPr lang="en-US"/>
           </a:p>
@@ -5672,7 +5626,7 @@
           <a:p>
             <a:fld id="{331BB52A-1119-4C62-AB93-D9C1ED94E901}" type="datetimeFigureOut">
               <a:rPr lang="en-US" smtClean="0"/>
-              <a:t>12/17/2025</a:t>
+              <a:t>12/21/2025</a:t>
             </a:fld>
             <a:endParaRPr lang="en-US"/>
           </a:p>
@@ -5920,7 +5874,7 @@
           <a:p>
             <a:fld id="{331BB52A-1119-4C62-AB93-D9C1ED94E901}" type="datetimeFigureOut">
               <a:rPr lang="en-US" smtClean="0"/>
-              <a:t>12/17/2025</a:t>
+              <a:t>12/21/2025</a:t>
             </a:fld>
             <a:endParaRPr lang="en-US"/>
           </a:p>
@@ -6452,7 +6406,7 @@
           <a:p>
             <a:fld id="{331BB52A-1119-4C62-AB93-D9C1ED94E901}" type="datetimeFigureOut">
               <a:rPr lang="en-US" smtClean="0"/>
-              <a:t>12/17/2025</a:t>
+              <a:t>12/21/2025</a:t>
             </a:fld>
             <a:endParaRPr lang="en-US"/>
           </a:p>
@@ -6749,7 +6703,7 @@
           <a:p>
             <a:fld id="{331BB52A-1119-4C62-AB93-D9C1ED94E901}" type="datetimeFigureOut">
               <a:rPr lang="en-US" smtClean="0"/>
-              <a:t>12/17/2025</a:t>
+              <a:t>12/21/2025</a:t>
             </a:fld>
             <a:endParaRPr lang="en-US"/>
           </a:p>
@@ -6923,7 +6877,7 @@
           <a:p>
             <a:fld id="{331BB52A-1119-4C62-AB93-D9C1ED94E901}" type="datetimeFigureOut">
               <a:rPr lang="en-US" smtClean="0"/>
-              <a:t>12/17/2025</a:t>
+              <a:t>12/21/2025</a:t>
             </a:fld>
             <a:endParaRPr lang="en-US"/>
           </a:p>
@@ -7103,7 +7057,7 @@
           <a:p>
             <a:fld id="{331BB52A-1119-4C62-AB93-D9C1ED94E901}" type="datetimeFigureOut">
               <a:rPr lang="en-US" smtClean="0"/>
-              <a:t>12/17/2025</a:t>
+              <a:t>12/21/2025</a:t>
             </a:fld>
             <a:endParaRPr lang="en-US"/>
           </a:p>
@@ -7311,7 +7265,7 @@
           <a:p>
             <a:fld id="{E778D16E-5DD9-40F0-A001-9BF546866B5B}" type="datetimeFigureOut">
               <a:rPr lang="en-US" smtClean="0"/>
-              <a:t>12/17/2025</a:t>
+              <a:t>12/21/2025</a:t>
             </a:fld>
             <a:endParaRPr lang="en-US"/>
           </a:p>
@@ -7509,7 +7463,7 @@
           <a:p>
             <a:fld id="{E778D16E-5DD9-40F0-A001-9BF546866B5B}" type="datetimeFigureOut">
               <a:rPr lang="en-US" smtClean="0"/>
-              <a:t>12/17/2025</a:t>
+              <a:t>12/21/2025</a:t>
             </a:fld>
             <a:endParaRPr lang="en-US"/>
           </a:p>
@@ -7691,7 +7645,7 @@
           <a:p>
             <a:fld id="{331BB52A-1119-4C62-AB93-D9C1ED94E901}" type="datetimeFigureOut">
               <a:rPr lang="en-US" smtClean="0"/>
-              <a:t>12/17/2025</a:t>
+              <a:t>12/21/2025</a:t>
             </a:fld>
             <a:endParaRPr lang="en-US"/>
           </a:p>
@@ -7959,7 +7913,7 @@
           <a:p>
             <a:fld id="{E778D16E-5DD9-40F0-A001-9BF546866B5B}" type="datetimeFigureOut">
               <a:rPr lang="en-US" smtClean="0"/>
-              <a:t>12/17/2025</a:t>
+              <a:t>12/21/2025</a:t>
             </a:fld>
             <a:endParaRPr lang="en-US"/>
           </a:p>
@@ -8224,7 +8178,7 @@
           <a:p>
             <a:fld id="{E778D16E-5DD9-40F0-A001-9BF546866B5B}" type="datetimeFigureOut">
               <a:rPr lang="en-US" smtClean="0"/>
-              <a:t>12/17/2025</a:t>
+              <a:t>12/21/2025</a:t>
             </a:fld>
             <a:endParaRPr lang="en-US"/>
           </a:p>
@@ -8636,7 +8590,7 @@
           <a:p>
             <a:fld id="{E778D16E-5DD9-40F0-A001-9BF546866B5B}" type="datetimeFigureOut">
               <a:rPr lang="en-US" smtClean="0"/>
-              <a:t>12/17/2025</a:t>
+              <a:t>12/21/2025</a:t>
             </a:fld>
             <a:endParaRPr lang="en-US"/>
           </a:p>
@@ -8777,7 +8731,7 @@
           <a:p>
             <a:fld id="{E778D16E-5DD9-40F0-A001-9BF546866B5B}" type="datetimeFigureOut">
               <a:rPr lang="en-US" smtClean="0"/>
-              <a:t>12/17/2025</a:t>
+              <a:t>12/21/2025</a:t>
             </a:fld>
             <a:endParaRPr lang="en-US"/>
           </a:p>
@@ -8890,7 +8844,7 @@
           <a:p>
             <a:fld id="{E778D16E-5DD9-40F0-A001-9BF546866B5B}" type="datetimeFigureOut">
               <a:rPr lang="en-US" smtClean="0"/>
-              <a:t>12/17/2025</a:t>
+              <a:t>12/21/2025</a:t>
             </a:fld>
             <a:endParaRPr lang="en-US"/>
           </a:p>
@@ -9201,7 +9155,7 @@
           <a:p>
             <a:fld id="{E778D16E-5DD9-40F0-A001-9BF546866B5B}" type="datetimeFigureOut">
               <a:rPr lang="en-US" smtClean="0"/>
-              <a:t>12/17/2025</a:t>
+              <a:t>12/21/2025</a:t>
             </a:fld>
             <a:endParaRPr lang="en-US"/>
           </a:p>
@@ -9489,7 +9443,7 @@
           <a:p>
             <a:fld id="{E778D16E-5DD9-40F0-A001-9BF546866B5B}" type="datetimeFigureOut">
               <a:rPr lang="en-US" smtClean="0"/>
-              <a:t>12/17/2025</a:t>
+              <a:t>12/21/2025</a:t>
             </a:fld>
             <a:endParaRPr lang="en-US"/>
           </a:p>
@@ -9687,7 +9641,7 @@
           <a:p>
             <a:fld id="{E778D16E-5DD9-40F0-A001-9BF546866B5B}" type="datetimeFigureOut">
               <a:rPr lang="en-US" smtClean="0"/>
-              <a:t>12/17/2025</a:t>
+              <a:t>12/21/2025</a:t>
             </a:fld>
             <a:endParaRPr lang="en-US"/>
           </a:p>
@@ -9895,7 +9849,7 @@
           <a:p>
             <a:fld id="{E778D16E-5DD9-40F0-A001-9BF546866B5B}" type="datetimeFigureOut">
               <a:rPr lang="en-US" smtClean="0"/>
-              <a:t>12/17/2025</a:t>
+              <a:t>12/21/2025</a:t>
             </a:fld>
             <a:endParaRPr lang="en-US"/>
           </a:p>
@@ -10115,7 +10069,7 @@
           <a:p>
             <a:fld id="{A7AC20F4-BAFA-45E4-A9C8-C2EC2EED0F56}" type="datetimeFigureOut">
               <a:rPr lang="en-US" smtClean="0"/>
-              <a:t>12/17/2025</a:t>
+              <a:t>12/21/2025</a:t>
             </a:fld>
             <a:endParaRPr lang="en-US"/>
           </a:p>
@@ -10373,7 +10327,7 @@
           <a:p>
             <a:fld id="{331BB52A-1119-4C62-AB93-D9C1ED94E901}" type="datetimeFigureOut">
               <a:rPr lang="en-US" smtClean="0"/>
-              <a:t>12/17/2025</a:t>
+              <a:t>12/21/2025</a:t>
             </a:fld>
             <a:endParaRPr lang="en-US"/>
           </a:p>
@@ -10559,7 +10513,7 @@
           <a:p>
             <a:fld id="{A7AC20F4-BAFA-45E4-A9C8-C2EC2EED0F56}" type="datetimeFigureOut">
               <a:rPr lang="en-US" smtClean="0"/>
-              <a:t>12/17/2025</a:t>
+              <a:t>12/21/2025</a:t>
             </a:fld>
             <a:endParaRPr lang="en-US"/>
           </a:p>
@@ -10834,7 +10788,7 @@
           <a:p>
             <a:fld id="{A7AC20F4-BAFA-45E4-A9C8-C2EC2EED0F56}" type="datetimeFigureOut">
               <a:rPr lang="en-US" smtClean="0"/>
-              <a:t>12/17/2025</a:t>
+              <a:t>12/21/2025</a:t>
             </a:fld>
             <a:endParaRPr lang="en-US"/>
           </a:p>
@@ -11099,7 +11053,7 @@
           <a:p>
             <a:fld id="{A7AC20F4-BAFA-45E4-A9C8-C2EC2EED0F56}" type="datetimeFigureOut">
               <a:rPr lang="en-US" smtClean="0"/>
-              <a:t>12/17/2025</a:t>
+              <a:t>12/21/2025</a:t>
             </a:fld>
             <a:endParaRPr lang="en-US"/>
           </a:p>
@@ -11511,7 +11465,7 @@
           <a:p>
             <a:fld id="{A7AC20F4-BAFA-45E4-A9C8-C2EC2EED0F56}" type="datetimeFigureOut">
               <a:rPr lang="en-US" smtClean="0"/>
-              <a:t>12/17/2025</a:t>
+              <a:t>12/21/2025</a:t>
             </a:fld>
             <a:endParaRPr lang="en-US"/>
           </a:p>
@@ -11652,7 +11606,7 @@
           <a:p>
             <a:fld id="{A7AC20F4-BAFA-45E4-A9C8-C2EC2EED0F56}" type="datetimeFigureOut">
               <a:rPr lang="en-US" smtClean="0"/>
-              <a:t>12/17/2025</a:t>
+              <a:t>12/21/2025</a:t>
             </a:fld>
             <a:endParaRPr lang="en-US"/>
           </a:p>
@@ -11765,7 +11719,7 @@
           <a:p>
             <a:fld id="{A7AC20F4-BAFA-45E4-A9C8-C2EC2EED0F56}" type="datetimeFigureOut">
               <a:rPr lang="en-US" smtClean="0"/>
-              <a:t>12/17/2025</a:t>
+              <a:t>12/21/2025</a:t>
             </a:fld>
             <a:endParaRPr lang="en-US"/>
           </a:p>
@@ -12076,7 +12030,7 @@
           <a:p>
             <a:fld id="{A7AC20F4-BAFA-45E4-A9C8-C2EC2EED0F56}" type="datetimeFigureOut">
               <a:rPr lang="en-US" smtClean="0"/>
-              <a:t>12/17/2025</a:t>
+              <a:t>12/21/2025</a:t>
             </a:fld>
             <a:endParaRPr lang="en-US"/>
           </a:p>
@@ -12364,7 +12318,7 @@
           <a:p>
             <a:fld id="{A7AC20F4-BAFA-45E4-A9C8-C2EC2EED0F56}" type="datetimeFigureOut">
               <a:rPr lang="en-US" smtClean="0"/>
-              <a:t>12/17/2025</a:t>
+              <a:t>12/21/2025</a:t>
             </a:fld>
             <a:endParaRPr lang="en-US"/>
           </a:p>
@@ -12562,7 +12516,7 @@
           <a:p>
             <a:fld id="{A7AC20F4-BAFA-45E4-A9C8-C2EC2EED0F56}" type="datetimeFigureOut">
               <a:rPr lang="en-US" smtClean="0"/>
-              <a:t>12/17/2025</a:t>
+              <a:t>12/21/2025</a:t>
             </a:fld>
             <a:endParaRPr lang="en-US"/>
           </a:p>
@@ -12770,7 +12724,7 @@
           <a:p>
             <a:fld id="{A7AC20F4-BAFA-45E4-A9C8-C2EC2EED0F56}" type="datetimeFigureOut">
               <a:rPr lang="en-US" smtClean="0"/>
-              <a:t>12/17/2025</a:t>
+              <a:t>12/21/2025</a:t>
             </a:fld>
             <a:endParaRPr lang="en-US"/>
           </a:p>
@@ -13079,7 +13033,7 @@
           <a:p>
             <a:fld id="{331BB52A-1119-4C62-AB93-D9C1ED94E901}" type="datetimeFigureOut">
               <a:rPr lang="en-US" smtClean="0"/>
-              <a:t>12/17/2025</a:t>
+              <a:t>12/21/2025</a:t>
             </a:fld>
             <a:endParaRPr lang="en-US"/>
           </a:p>
@@ -13521,7 +13475,7 @@
           <a:p>
             <a:fld id="{331BB52A-1119-4C62-AB93-D9C1ED94E901}" type="datetimeFigureOut">
               <a:rPr lang="en-US" smtClean="0"/>
-              <a:t>12/17/2025</a:t>
+              <a:t>12/21/2025</a:t>
             </a:fld>
             <a:endParaRPr lang="en-US"/>
           </a:p>
@@ -13639,7 +13593,7 @@
           <a:p>
             <a:fld id="{331BB52A-1119-4C62-AB93-D9C1ED94E901}" type="datetimeFigureOut">
               <a:rPr lang="en-US" smtClean="0"/>
-              <a:t>12/17/2025</a:t>
+              <a:t>12/21/2025</a:t>
             </a:fld>
             <a:endParaRPr lang="en-US"/>
           </a:p>
@@ -13734,7 +13688,7 @@
           <a:p>
             <a:fld id="{331BB52A-1119-4C62-AB93-D9C1ED94E901}" type="datetimeFigureOut">
               <a:rPr lang="en-US" smtClean="0"/>
-              <a:t>12/17/2025</a:t>
+              <a:t>12/21/2025</a:t>
             </a:fld>
             <a:endParaRPr lang="en-US"/>
           </a:p>
@@ -14017,7 +13971,7 @@
           <a:p>
             <a:fld id="{331BB52A-1119-4C62-AB93-D9C1ED94E901}" type="datetimeFigureOut">
               <a:rPr lang="en-US" smtClean="0"/>
-              <a:t>12/17/2025</a:t>
+              <a:t>12/21/2025</a:t>
             </a:fld>
             <a:endParaRPr lang="en-US"/>
           </a:p>
@@ -14308,7 +14262,7 @@
           <a:p>
             <a:fld id="{331BB52A-1119-4C62-AB93-D9C1ED94E901}" type="datetimeFigureOut">
               <a:rPr lang="en-US" smtClean="0"/>
-              <a:t>12/17/2025</a:t>
+              <a:t>12/21/2025</a:t>
             </a:fld>
             <a:endParaRPr lang="en-US"/>
           </a:p>
@@ -14450,6 +14404,13 @@
               <a:noFill/>
             </a:ln>
           </p:spPr>
+          <p:txBody>
+            <a:bodyPr/>
+            <a:lstStyle/>
+            <a:p>
+              <a:endParaRPr lang="en-US"/>
+            </a:p>
+          </p:txBody>
         </p:sp>
         <p:sp>
           <p:nvSpPr>
@@ -14499,6 +14460,13 @@
               <a:noFill/>
             </a:ln>
           </p:spPr>
+          <p:txBody>
+            <a:bodyPr/>
+            <a:lstStyle/>
+            <a:p>
+              <a:endParaRPr lang="en-US"/>
+            </a:p>
+          </p:txBody>
         </p:sp>
         <p:sp>
           <p:nvSpPr>
@@ -14545,6 +14513,13 @@
               <a:noFill/>
             </a:ln>
           </p:spPr>
+          <p:txBody>
+            <a:bodyPr/>
+            <a:lstStyle/>
+            <a:p>
+              <a:endParaRPr lang="en-US"/>
+            </a:p>
+          </p:txBody>
         </p:sp>
         <p:sp>
           <p:nvSpPr>
@@ -14590,6 +14565,13 @@
               <a:noFill/>
             </a:ln>
           </p:spPr>
+          <p:txBody>
+            <a:bodyPr/>
+            <a:lstStyle/>
+            <a:p>
+              <a:endParaRPr lang="en-US"/>
+            </a:p>
+          </p:txBody>
         </p:sp>
         <p:sp>
           <p:nvSpPr>
@@ -14641,6 +14623,13 @@
               <a:noFill/>
             </a:ln>
           </p:spPr>
+          <p:txBody>
+            <a:bodyPr/>
+            <a:lstStyle/>
+            <a:p>
+              <a:endParaRPr lang="en-US"/>
+            </a:p>
+          </p:txBody>
         </p:sp>
         <p:sp>
           <p:nvSpPr>
@@ -14705,6 +14694,13 @@
               <a:noFill/>
             </a:ln>
           </p:spPr>
+          <p:txBody>
+            <a:bodyPr/>
+            <a:lstStyle/>
+            <a:p>
+              <a:endParaRPr lang="en-US"/>
+            </a:p>
+          </p:txBody>
         </p:sp>
       </p:grpSp>
       <p:sp>
@@ -14837,7 +14833,7 @@
           <a:p>
             <a:fld id="{331BB52A-1119-4C62-AB93-D9C1ED94E901}" type="datetimeFigureOut">
               <a:rPr lang="en-US" smtClean="0"/>
-              <a:t>12/17/2025</a:t>
+              <a:t>12/21/2025</a:t>
             </a:fld>
             <a:endParaRPr lang="en-US"/>
           </a:p>
@@ -15519,7 +15515,7 @@
           <a:p>
             <a:fld id="{E778D16E-5DD9-40F0-A001-9BF546866B5B}" type="datetimeFigureOut">
               <a:rPr lang="en-US" smtClean="0"/>
-              <a:t>12/17/2025</a:t>
+              <a:t>12/21/2025</a:t>
             </a:fld>
             <a:endParaRPr lang="en-US"/>
           </a:p>
@@ -16087,7 +16083,7 @@
           <a:p>
             <a:fld id="{A7AC20F4-BAFA-45E4-A9C8-C2EC2EED0F56}" type="datetimeFigureOut">
               <a:rPr lang="en-US" smtClean="0"/>
-              <a:t>12/17/2025</a:t>
+              <a:t>12/21/2025</a:t>
             </a:fld>
             <a:endParaRPr lang="en-US"/>
           </a:p>
@@ -16607,7 +16603,7 @@
         </p:nvSpPr>
         <p:spPr>
           <a:xfrm>
-            <a:off x="4905902" y="5893349"/>
+            <a:off x="4905902" y="5955694"/>
             <a:ext cx="6987645" cy="461433"/>
           </a:xfrm>
         </p:spPr>
@@ -16839,7 +16835,7 @@
         <p:spPr>
           <a:xfrm>
             <a:off x="1905000" y="1962150"/>
-            <a:ext cx="9591675" cy="1200329"/>
+            <a:ext cx="10046336" cy="1200329"/>
           </a:xfrm>
           <a:prstGeom prst="rect">
             <a:avLst/>
@@ -16854,7 +16850,19 @@
           <a:p>
             <a:r>
               <a:rPr lang="en-US" dirty="0"/>
-              <a:t>• Unit tests cover: habit creation, check-off behavior, streak calculations, analytics filters. • Edge cases handled: duplicate check-offs in same period; empty completion history; mixed daily/weekly. • Storage is abstracted → tests can use </a:t>
+              <a:t>• Unit tests cover: habit creation, check-off behavior, streak calculations, analytics filters. </a:t>
+            </a:r>
+          </a:p>
+          <a:p>
+            <a:r>
+              <a:rPr lang="en-US" dirty="0"/>
+              <a:t>• Edge cases handled: duplicate check-offs in same period; empty completion history; mixed daily/weekly. </a:t>
+            </a:r>
+          </a:p>
+          <a:p>
+            <a:r>
+              <a:rPr lang="en-US" dirty="0"/>
+              <a:t>• Storage is abstracted → tests can use </a:t>
             </a:r>
             <a:r>
               <a:rPr lang="en-US" dirty="0" err="1"/>
@@ -16862,7 +16870,13 @@
             </a:r>
             <a:r>
               <a:rPr lang="en-US" dirty="0"/>
-              <a:t> to isolate logic. • Docstrings + README ensure reproducible setup and usage.</a:t>
+              <a:t> to isolate logic. </a:t>
+            </a:r>
+          </a:p>
+          <a:p>
+            <a:r>
+              <a:rPr lang="en-US" dirty="0"/>
+              <a:t>• Docstrings + README ensure reproducible setup and usage.</a:t>
             </a:r>
           </a:p>
         </p:txBody>
@@ -16889,7 +16903,7 @@
         </p:blipFill>
         <p:spPr>
           <a:xfrm>
-            <a:off x="1802179" y="3409417"/>
+            <a:off x="1831581" y="3428467"/>
             <a:ext cx="10193173" cy="2924583"/>
           </a:xfrm>
           <a:prstGeom prst="rect">
@@ -17221,7 +17235,7 @@
                 <a:ea typeface="Calibri" panose="020F0502020204030204" pitchFamily="34" charset="0"/>
                 <a:cs typeface="Calibri" panose="020F0502020204030204" pitchFamily="34" charset="0"/>
               </a:rPr>
-              <a:t>• Goal: track daily/weekly habits, record check-offs, and compute streak analytics </a:t>
+              <a:t>• Goal: track daily/weekly habits, record check-offs, and compute streak analytics with authentication</a:t>
             </a:r>
           </a:p>
           <a:p>
@@ -17532,13 +17546,13 @@
           <p:nvPr>
             <p:extLst>
               <p:ext uri="{D42A27DB-BD31-4B8C-83A1-F6EECF244321}">
-                <p14:modId xmlns:p14="http://schemas.microsoft.com/office/powerpoint/2010/main" val="3101832503"/>
+                <p14:modId xmlns:p14="http://schemas.microsoft.com/office/powerpoint/2010/main" val="115665886"/>
               </p:ext>
             </p:extLst>
           </p:nvPr>
         </p:nvGraphicFramePr>
         <p:xfrm>
-          <a:off x="1802179" y="1797009"/>
+          <a:off x="1802179" y="1452624"/>
           <a:ext cx="9964219" cy="2978707"/>
         </p:xfrm>
         <a:graphic>
@@ -17561,7 +17575,7 @@
         </p:nvSpPr>
         <p:spPr>
           <a:xfrm>
-            <a:off x="1802179" y="4591050"/>
+            <a:off x="1802179" y="4061999"/>
             <a:ext cx="9709581" cy="369332"/>
           </a:xfrm>
           <a:prstGeom prst="rect">
@@ -17639,7 +17653,7 @@
         </p:nvSpPr>
         <p:spPr>
           <a:xfrm>
-            <a:off x="1802179" y="854689"/>
+            <a:off x="1802179" y="847120"/>
             <a:ext cx="10149157" cy="381000"/>
           </a:xfrm>
         </p:spPr>
@@ -17746,10 +17760,10 @@
       </p:sp>
       <p:pic>
         <p:nvPicPr>
-          <p:cNvPr id="8" name="Picture 7">
+          <p:cNvPr id="14" name="Picture 13">
             <a:extLst>
               <a:ext uri="{FF2B5EF4-FFF2-40B4-BE49-F238E27FC236}">
-                <a16:creationId xmlns:a16="http://schemas.microsoft.com/office/drawing/2014/main" id="{8C34105A-897E-2755-A13F-8BDC63B72397}"/>
+                <a16:creationId xmlns:a16="http://schemas.microsoft.com/office/drawing/2014/main" id="{81582A0F-798E-69EE-7600-40FE4482750D}"/>
               </a:ext>
             </a:extLst>
           </p:cNvPr>
@@ -17766,67 +17780,7 @@
         </p:blipFill>
         <p:spPr>
           <a:xfrm>
-            <a:off x="7118687" y="2467912"/>
-            <a:ext cx="4832649" cy="742950"/>
-          </a:xfrm>
-          <a:prstGeom prst="rect">
-            <a:avLst/>
-          </a:prstGeom>
-        </p:spPr>
-      </p:pic>
-      <p:pic>
-        <p:nvPicPr>
-          <p:cNvPr id="12" name="Picture 11">
-            <a:extLst>
-              <a:ext uri="{FF2B5EF4-FFF2-40B4-BE49-F238E27FC236}">
-                <a16:creationId xmlns:a16="http://schemas.microsoft.com/office/drawing/2014/main" id="{166E3876-7FE6-6CDF-C1B3-64203B917F1D}"/>
-              </a:ext>
-            </a:extLst>
-          </p:cNvPr>
-          <p:cNvPicPr>
-            <a:picLocks noChangeAspect="1"/>
-          </p:cNvPicPr>
-          <p:nvPr/>
-        </p:nvPicPr>
-        <p:blipFill>
-          <a:blip r:embed="rId3"/>
-          <a:stretch>
-            <a:fillRect/>
-          </a:stretch>
-        </p:blipFill>
-        <p:spPr>
-          <a:xfrm>
-            <a:off x="7118687" y="3271280"/>
-            <a:ext cx="4820331" cy="863506"/>
-          </a:xfrm>
-          <a:prstGeom prst="rect">
-            <a:avLst/>
-          </a:prstGeom>
-        </p:spPr>
-      </p:pic>
-      <p:pic>
-        <p:nvPicPr>
-          <p:cNvPr id="14" name="Picture 13">
-            <a:extLst>
-              <a:ext uri="{FF2B5EF4-FFF2-40B4-BE49-F238E27FC236}">
-                <a16:creationId xmlns:a16="http://schemas.microsoft.com/office/drawing/2014/main" id="{81582A0F-798E-69EE-7600-40FE4482750D}"/>
-              </a:ext>
-            </a:extLst>
-          </p:cNvPr>
-          <p:cNvPicPr>
-            <a:picLocks noChangeAspect="1"/>
-          </p:cNvPicPr>
-          <p:nvPr/>
-        </p:nvPicPr>
-        <p:blipFill>
-          <a:blip r:embed="rId4"/>
-          <a:stretch>
-            <a:fillRect/>
-          </a:stretch>
-        </p:blipFill>
-        <p:spPr>
-          <a:xfrm>
-            <a:off x="7118687" y="4226620"/>
+            <a:off x="7118687" y="6183764"/>
             <a:ext cx="4832649" cy="520733"/>
           </a:xfrm>
           <a:prstGeom prst="rect">
@@ -17849,14 +17803,14 @@
           <p:nvPr/>
         </p:nvPicPr>
         <p:blipFill>
-          <a:blip r:embed="rId5"/>
+          <a:blip r:embed="rId3"/>
           <a:stretch>
             <a:fillRect/>
           </a:stretch>
         </p:blipFill>
         <p:spPr>
           <a:xfrm>
-            <a:off x="1905000" y="2467912"/>
+            <a:off x="1905000" y="2308688"/>
             <a:ext cx="4950734" cy="3535399"/>
           </a:xfrm>
           <a:prstGeom prst="rect">
@@ -17878,7 +17832,7 @@
         </p:nvSpPr>
         <p:spPr>
           <a:xfrm>
-            <a:off x="1802179" y="2034716"/>
+            <a:off x="1802179" y="1875492"/>
             <a:ext cx="1664921" cy="369332"/>
           </a:xfrm>
           <a:prstGeom prst="rect">
@@ -17913,8 +17867,8 @@
         </p:nvSpPr>
         <p:spPr>
           <a:xfrm>
-            <a:off x="7019925" y="2057532"/>
-            <a:ext cx="884281" cy="369332"/>
+            <a:off x="7019925" y="1898308"/>
+            <a:ext cx="805733" cy="369332"/>
           </a:xfrm>
           <a:prstGeom prst="rect">
             <a:avLst/>
@@ -17929,9 +17883,104 @@
           <a:p>
             <a:r>
               <a:rPr lang="en-US" dirty="0" err="1"/>
-              <a:t>SQLLite</a:t>
+              <a:t>SqlLite</a:t>
             </a:r>
             <a:endParaRPr lang="en-US" dirty="0"/>
+          </a:p>
+        </p:txBody>
+      </p:sp>
+      <p:pic>
+        <p:nvPicPr>
+          <p:cNvPr id="6" name="Picture 5">
+            <a:extLst>
+              <a:ext uri="{FF2B5EF4-FFF2-40B4-BE49-F238E27FC236}">
+                <a16:creationId xmlns:a16="http://schemas.microsoft.com/office/drawing/2014/main" id="{F944AA5A-5A87-B0AE-244E-8C95F1443FBD}"/>
+              </a:ext>
+            </a:extLst>
+          </p:cNvPr>
+          <p:cNvPicPr>
+            <a:picLocks noChangeAspect="1"/>
+          </p:cNvPicPr>
+          <p:nvPr/>
+        </p:nvPicPr>
+        <p:blipFill>
+          <a:blip r:embed="rId4"/>
+          <a:stretch>
+            <a:fillRect/>
+          </a:stretch>
+        </p:blipFill>
+        <p:spPr>
+          <a:xfrm>
+            <a:off x="7106368" y="2308688"/>
+            <a:ext cx="4832650" cy="1250644"/>
+          </a:xfrm>
+          <a:prstGeom prst="rect">
+            <a:avLst/>
+          </a:prstGeom>
+        </p:spPr>
+      </p:pic>
+      <p:pic>
+        <p:nvPicPr>
+          <p:cNvPr id="9" name="Picture 8">
+            <a:extLst>
+              <a:ext uri="{FF2B5EF4-FFF2-40B4-BE49-F238E27FC236}">
+                <a16:creationId xmlns:a16="http://schemas.microsoft.com/office/drawing/2014/main" id="{021BB230-8610-FCAB-BB65-B17BA8CEC90A}"/>
+              </a:ext>
+            </a:extLst>
+          </p:cNvPr>
+          <p:cNvPicPr>
+            <a:picLocks noChangeAspect="1"/>
+          </p:cNvPicPr>
+          <p:nvPr/>
+        </p:nvPicPr>
+        <p:blipFill>
+          <a:blip r:embed="rId5"/>
+          <a:stretch>
+            <a:fillRect/>
+          </a:stretch>
+        </p:blipFill>
+        <p:spPr>
+          <a:xfrm>
+            <a:off x="7106366" y="3878949"/>
+            <a:ext cx="4832649" cy="2026246"/>
+          </a:xfrm>
+          <a:prstGeom prst="rect">
+            <a:avLst/>
+          </a:prstGeom>
+        </p:spPr>
+      </p:pic>
+      <p:sp>
+        <p:nvSpPr>
+          <p:cNvPr id="3" name="TextBox 2">
+            <a:extLst>
+              <a:ext uri="{FF2B5EF4-FFF2-40B4-BE49-F238E27FC236}">
+                <a16:creationId xmlns:a16="http://schemas.microsoft.com/office/drawing/2014/main" id="{F1EEF4E9-19F3-0BF8-7670-B0C0AB41201F}"/>
+              </a:ext>
+            </a:extLst>
+          </p:cNvPr>
+          <p:cNvSpPr txBox="1"/>
+          <p:nvPr/>
+        </p:nvSpPr>
+        <p:spPr>
+          <a:xfrm>
+            <a:off x="7019925" y="3600380"/>
+            <a:ext cx="3840410" cy="307777"/>
+          </a:xfrm>
+          <a:prstGeom prst="rect">
+            <a:avLst/>
+          </a:prstGeom>
+          <a:noFill/>
+        </p:spPr>
+        <p:txBody>
+          <a:bodyPr wrap="none" rtlCol="0">
+            <a:spAutoFit/>
+          </a:bodyPr>
+          <a:lstStyle/>
+          <a:p>
+            <a:r>
+              <a:rPr lang="en-US" sz="1400" dirty="0"/>
+              <a:t>Each completion is stored as a timestamped event</a:t>
+            </a:r>
           </a:p>
         </p:txBody>
       </p:sp>
@@ -18119,7 +18168,7 @@
         </p:blipFill>
         <p:spPr>
           <a:xfrm>
-            <a:off x="6208788" y="3232987"/>
+            <a:off x="9901172" y="3352187"/>
             <a:ext cx="1851147" cy="1031555"/>
           </a:xfrm>
           <a:prstGeom prst="rect">
@@ -18149,7 +18198,7 @@
         </p:blipFill>
         <p:spPr>
           <a:xfrm>
-            <a:off x="1386682" y="3334267"/>
+            <a:off x="1859535" y="3343550"/>
             <a:ext cx="3200847" cy="752580"/>
           </a:xfrm>
           <a:prstGeom prst="rect">
@@ -18179,38 +18228,8 @@
         </p:blipFill>
         <p:spPr>
           <a:xfrm>
-            <a:off x="6937801" y="5339204"/>
+            <a:off x="8465735" y="5315113"/>
             <a:ext cx="3286584" cy="1286054"/>
-          </a:xfrm>
-          <a:prstGeom prst="rect">
-            <a:avLst/>
-          </a:prstGeom>
-        </p:spPr>
-      </p:pic>
-      <p:pic>
-        <p:nvPicPr>
-          <p:cNvPr id="29" name="Picture 28">
-            <a:extLst>
-              <a:ext uri="{FF2B5EF4-FFF2-40B4-BE49-F238E27FC236}">
-                <a16:creationId xmlns:a16="http://schemas.microsoft.com/office/drawing/2014/main" id="{7579B873-DFA8-002D-FFCA-535CA88F027D}"/>
-              </a:ext>
-            </a:extLst>
-          </p:cNvPr>
-          <p:cNvPicPr>
-            <a:picLocks noChangeAspect="1"/>
-          </p:cNvPicPr>
-          <p:nvPr/>
-        </p:nvPicPr>
-        <p:blipFill>
-          <a:blip r:embed="rId5"/>
-          <a:stretch>
-            <a:fillRect/>
-          </a:stretch>
-        </p:blipFill>
-        <p:spPr>
-          <a:xfrm>
-            <a:off x="1453826" y="4856221"/>
-            <a:ext cx="3517392" cy="1970058"/>
           </a:xfrm>
           <a:prstGeom prst="rect">
             <a:avLst/>
@@ -18232,14 +18251,14 @@
           <p:nvPr/>
         </p:nvPicPr>
         <p:blipFill>
-          <a:blip r:embed="rId6"/>
+          <a:blip r:embed="rId5"/>
           <a:stretch>
             <a:fillRect/>
           </a:stretch>
         </p:blipFill>
         <p:spPr>
           <a:xfrm>
-            <a:off x="1420254" y="2016966"/>
+            <a:off x="1857822" y="2023226"/>
             <a:ext cx="3584536" cy="946723"/>
           </a:xfrm>
           <a:prstGeom prst="rect">
@@ -18262,14 +18281,14 @@
           <p:nvPr/>
         </p:nvPicPr>
         <p:blipFill>
-          <a:blip r:embed="rId7"/>
+          <a:blip r:embed="rId6"/>
           <a:stretch>
             <a:fillRect/>
           </a:stretch>
         </p:blipFill>
         <p:spPr>
           <a:xfrm>
-            <a:off x="5362574" y="2001902"/>
+            <a:off x="6480674" y="2008162"/>
             <a:ext cx="5285724" cy="1007188"/>
           </a:xfrm>
           <a:prstGeom prst="rect">
@@ -18292,14 +18311,14 @@
           <p:nvPr/>
         </p:nvPicPr>
         <p:blipFill>
-          <a:blip r:embed="rId8"/>
+          <a:blip r:embed="rId7"/>
           <a:stretch>
             <a:fillRect/>
           </a:stretch>
         </p:blipFill>
         <p:spPr>
           <a:xfrm>
-            <a:off x="9495373" y="3365831"/>
+            <a:off x="6533568" y="3379111"/>
             <a:ext cx="2169066" cy="1396747"/>
           </a:xfrm>
           <a:prstGeom prst="rect">
@@ -18309,28 +18328,779 @@
       </p:pic>
       <p:cxnSp>
         <p:nvCxnSpPr>
-          <p:cNvPr id="42" name="Connector: Elbow 41">
+          <p:cNvPr id="122" name="Connector: Elbow 121">
             <a:extLst>
               <a:ext uri="{FF2B5EF4-FFF2-40B4-BE49-F238E27FC236}">
-                <a16:creationId xmlns:a16="http://schemas.microsoft.com/office/drawing/2014/main" id="{AF305DE7-947D-80EF-1774-3AEC1DC4B670}"/>
+                <a16:creationId xmlns:a16="http://schemas.microsoft.com/office/drawing/2014/main" id="{23C7872C-B0CF-8961-A2D2-075DF2EBF9D1}"/>
               </a:ext>
             </a:extLst>
           </p:cNvPr>
           <p:cNvCxnSpPr>
             <a:cxnSpLocks/>
-            <a:stCxn id="33" idx="3"/>
-            <a:endCxn id="35" idx="3"/>
           </p:cNvCxnSpPr>
           <p:nvPr/>
         </p:nvCxnSpPr>
         <p:spPr>
           <a:xfrm>
-            <a:off x="10648298" y="2505496"/>
-            <a:ext cx="1016141" cy="1558709"/>
+            <a:off x="8702634" y="4582412"/>
+            <a:ext cx="1425712" cy="731650"/>
           </a:xfrm>
           <a:prstGeom prst="bentConnector3">
             <a:avLst>
-              <a:gd name="adj1" fmla="val 122497"/>
+              <a:gd name="adj1" fmla="val 100046"/>
+            </a:avLst>
+          </a:prstGeom>
+          <a:ln>
+            <a:tailEnd type="triangle"/>
+          </a:ln>
+        </p:spPr>
+        <p:style>
+          <a:lnRef idx="2">
+            <a:schemeClr val="dk1"/>
+          </a:lnRef>
+          <a:fillRef idx="0">
+            <a:schemeClr val="dk1"/>
+          </a:fillRef>
+          <a:effectRef idx="1">
+            <a:schemeClr val="dk1"/>
+          </a:effectRef>
+          <a:fontRef idx="minor">
+            <a:schemeClr val="tx1"/>
+          </a:fontRef>
+        </p:style>
+      </p:cxnSp>
+      <p:sp>
+        <p:nvSpPr>
+          <p:cNvPr id="162" name="TextBox 161">
+            <a:extLst>
+              <a:ext uri="{FF2B5EF4-FFF2-40B4-BE49-F238E27FC236}">
+                <a16:creationId xmlns:a16="http://schemas.microsoft.com/office/drawing/2014/main" id="{621095E8-C57D-5C90-9103-A539067B800C}"/>
+              </a:ext>
+            </a:extLst>
+          </p:cNvPr>
+          <p:cNvSpPr txBox="1"/>
+          <p:nvPr/>
+        </p:nvSpPr>
+        <p:spPr>
+          <a:xfrm>
+            <a:off x="6452548" y="3103243"/>
+            <a:ext cx="1138453" cy="338554"/>
+          </a:xfrm>
+          <a:prstGeom prst="rect">
+            <a:avLst/>
+          </a:prstGeom>
+          <a:noFill/>
+        </p:spPr>
+        <p:txBody>
+          <a:bodyPr wrap="none" rtlCol="0">
+            <a:spAutoFit/>
+          </a:bodyPr>
+          <a:lstStyle/>
+          <a:p>
+            <a:r>
+              <a:rPr lang="en-US" sz="1600" dirty="0"/>
+              <a:t>Main menu</a:t>
+            </a:r>
+          </a:p>
+        </p:txBody>
+      </p:sp>
+      <p:sp>
+        <p:nvSpPr>
+          <p:cNvPr id="168" name="TextBox 167">
+            <a:extLst>
+              <a:ext uri="{FF2B5EF4-FFF2-40B4-BE49-F238E27FC236}">
+                <a16:creationId xmlns:a16="http://schemas.microsoft.com/office/drawing/2014/main" id="{5F9AD5B6-70D8-9DBF-DB0B-CB6843B24448}"/>
+              </a:ext>
+            </a:extLst>
+          </p:cNvPr>
+          <p:cNvSpPr txBox="1"/>
+          <p:nvPr/>
+        </p:nvSpPr>
+        <p:spPr>
+          <a:xfrm>
+            <a:off x="8402153" y="5029760"/>
+            <a:ext cx="1458476" cy="338554"/>
+          </a:xfrm>
+          <a:prstGeom prst="rect">
+            <a:avLst/>
+          </a:prstGeom>
+          <a:noFill/>
+        </p:spPr>
+        <p:txBody>
+          <a:bodyPr wrap="none" rtlCol="0">
+            <a:spAutoFit/>
+          </a:bodyPr>
+          <a:lstStyle/>
+          <a:p>
+            <a:r>
+              <a:rPr lang="en-US" sz="1600" dirty="0"/>
+              <a:t>Analytics menu</a:t>
+            </a:r>
+          </a:p>
+        </p:txBody>
+      </p:sp>
+      <p:sp>
+        <p:nvSpPr>
+          <p:cNvPr id="170" name="TextBox 169">
+            <a:extLst>
+              <a:ext uri="{FF2B5EF4-FFF2-40B4-BE49-F238E27FC236}">
+                <a16:creationId xmlns:a16="http://schemas.microsoft.com/office/drawing/2014/main" id="{06DE68C7-E2F9-11DD-8569-0A51AD5444CF}"/>
+              </a:ext>
+            </a:extLst>
+          </p:cNvPr>
+          <p:cNvSpPr txBox="1"/>
+          <p:nvPr/>
+        </p:nvSpPr>
+        <p:spPr>
+          <a:xfrm>
+            <a:off x="1718455" y="4596328"/>
+            <a:ext cx="1542410" cy="338554"/>
+          </a:xfrm>
+          <a:prstGeom prst="rect">
+            <a:avLst/>
+          </a:prstGeom>
+          <a:noFill/>
+        </p:spPr>
+        <p:txBody>
+          <a:bodyPr wrap="none" rtlCol="0">
+            <a:spAutoFit/>
+          </a:bodyPr>
+          <a:lstStyle/>
+          <a:p>
+            <a:r>
+              <a:rPr lang="en-US" sz="1600" dirty="0"/>
+              <a:t>Habit inspection</a:t>
+            </a:r>
+          </a:p>
+        </p:txBody>
+      </p:sp>
+      <p:sp>
+        <p:nvSpPr>
+          <p:cNvPr id="175" name="TextBox 174">
+            <a:extLst>
+              <a:ext uri="{FF2B5EF4-FFF2-40B4-BE49-F238E27FC236}">
+                <a16:creationId xmlns:a16="http://schemas.microsoft.com/office/drawing/2014/main" id="{9D32B05A-A434-E694-26EF-A181CC9B4D53}"/>
+              </a:ext>
+            </a:extLst>
+          </p:cNvPr>
+          <p:cNvSpPr txBox="1"/>
+          <p:nvPr/>
+        </p:nvSpPr>
+        <p:spPr>
+          <a:xfrm>
+            <a:off x="9840061" y="3094553"/>
+            <a:ext cx="1366271" cy="338554"/>
+          </a:xfrm>
+          <a:prstGeom prst="rect">
+            <a:avLst/>
+          </a:prstGeom>
+          <a:noFill/>
+        </p:spPr>
+        <p:txBody>
+          <a:bodyPr wrap="none" rtlCol="0">
+            <a:spAutoFit/>
+          </a:bodyPr>
+          <a:lstStyle/>
+          <a:p>
+            <a:r>
+              <a:rPr lang="en-US" sz="1600" dirty="0"/>
+              <a:t>Habit creation</a:t>
+            </a:r>
+          </a:p>
+        </p:txBody>
+      </p:sp>
+      <p:sp>
+        <p:nvSpPr>
+          <p:cNvPr id="177" name="TextBox 176">
+            <a:extLst>
+              <a:ext uri="{FF2B5EF4-FFF2-40B4-BE49-F238E27FC236}">
+                <a16:creationId xmlns:a16="http://schemas.microsoft.com/office/drawing/2014/main" id="{28B22B98-943D-4128-1099-69F3650B81E4}"/>
+              </a:ext>
+            </a:extLst>
+          </p:cNvPr>
+          <p:cNvSpPr txBox="1"/>
+          <p:nvPr/>
+        </p:nvSpPr>
+        <p:spPr>
+          <a:xfrm>
+            <a:off x="1718455" y="3064314"/>
+            <a:ext cx="878638" cy="307777"/>
+          </a:xfrm>
+          <a:prstGeom prst="rect">
+            <a:avLst/>
+          </a:prstGeom>
+          <a:noFill/>
+        </p:spPr>
+        <p:txBody>
+          <a:bodyPr wrap="none" rtlCol="0">
+            <a:spAutoFit/>
+          </a:bodyPr>
+          <a:lstStyle/>
+          <a:p>
+            <a:r>
+              <a:rPr lang="en-US" sz="1400" dirty="0"/>
+              <a:t>Check-off</a:t>
+            </a:r>
+          </a:p>
+        </p:txBody>
+      </p:sp>
+      <p:sp>
+        <p:nvSpPr>
+          <p:cNvPr id="187" name="TextBox 186">
+            <a:extLst>
+              <a:ext uri="{FF2B5EF4-FFF2-40B4-BE49-F238E27FC236}">
+                <a16:creationId xmlns:a16="http://schemas.microsoft.com/office/drawing/2014/main" id="{7D3BB3DC-E3D7-3B3D-CFAD-FE00D33A5ABD}"/>
+              </a:ext>
+            </a:extLst>
+          </p:cNvPr>
+          <p:cNvSpPr txBox="1"/>
+          <p:nvPr/>
+        </p:nvSpPr>
+        <p:spPr>
+          <a:xfrm>
+            <a:off x="1794213" y="1756664"/>
+            <a:ext cx="1390894" cy="307777"/>
+          </a:xfrm>
+          <a:prstGeom prst="rect">
+            <a:avLst/>
+          </a:prstGeom>
+          <a:noFill/>
+        </p:spPr>
+        <p:txBody>
+          <a:bodyPr wrap="none" rtlCol="0">
+            <a:spAutoFit/>
+          </a:bodyPr>
+          <a:lstStyle/>
+          <a:p>
+            <a:r>
+              <a:rPr lang="en-US" sz="1400" dirty="0"/>
+              <a:t>Welcome Screen</a:t>
+            </a:r>
+          </a:p>
+        </p:txBody>
+      </p:sp>
+      <p:sp>
+        <p:nvSpPr>
+          <p:cNvPr id="188" name="TextBox 187">
+            <a:extLst>
+              <a:ext uri="{FF2B5EF4-FFF2-40B4-BE49-F238E27FC236}">
+                <a16:creationId xmlns:a16="http://schemas.microsoft.com/office/drawing/2014/main" id="{DE88E7CD-770D-A239-32D6-4E21165A0E3B}"/>
+              </a:ext>
+            </a:extLst>
+          </p:cNvPr>
+          <p:cNvSpPr txBox="1"/>
+          <p:nvPr/>
+        </p:nvSpPr>
+        <p:spPr>
+          <a:xfrm>
+            <a:off x="6445975" y="1696162"/>
+            <a:ext cx="575799" cy="307777"/>
+          </a:xfrm>
+          <a:prstGeom prst="rect">
+            <a:avLst/>
+          </a:prstGeom>
+          <a:noFill/>
+        </p:spPr>
+        <p:txBody>
+          <a:bodyPr wrap="none" rtlCol="0">
+            <a:spAutoFit/>
+          </a:bodyPr>
+          <a:lstStyle/>
+          <a:p>
+            <a:r>
+              <a:rPr lang="en-US" sz="1400" dirty="0"/>
+              <a:t>Login</a:t>
+            </a:r>
+          </a:p>
+        </p:txBody>
+      </p:sp>
+      <p:cxnSp>
+        <p:nvCxnSpPr>
+          <p:cNvPr id="9" name="Straight Arrow Connector 8">
+            <a:extLst>
+              <a:ext uri="{FF2B5EF4-FFF2-40B4-BE49-F238E27FC236}">
+                <a16:creationId xmlns:a16="http://schemas.microsoft.com/office/drawing/2014/main" id="{4128B626-CD44-CC24-10A9-B7986448D935}"/>
+              </a:ext>
+            </a:extLst>
+          </p:cNvPr>
+          <p:cNvCxnSpPr>
+            <a:cxnSpLocks/>
+            <a:endCxn id="33" idx="1"/>
+          </p:cNvCxnSpPr>
+          <p:nvPr/>
+        </p:nvCxnSpPr>
+        <p:spPr>
+          <a:xfrm>
+            <a:off x="5442358" y="2511756"/>
+            <a:ext cx="1038316" cy="0"/>
+          </a:xfrm>
+          <a:prstGeom prst="straightConnector1">
+            <a:avLst/>
+          </a:prstGeom>
+          <a:ln>
+            <a:tailEnd type="triangle"/>
+          </a:ln>
+        </p:spPr>
+        <p:style>
+          <a:lnRef idx="2">
+            <a:schemeClr val="dk1"/>
+          </a:lnRef>
+          <a:fillRef idx="0">
+            <a:schemeClr val="dk1"/>
+          </a:fillRef>
+          <a:effectRef idx="1">
+            <a:schemeClr val="dk1"/>
+          </a:effectRef>
+          <a:fontRef idx="minor">
+            <a:schemeClr val="tx1"/>
+          </a:fontRef>
+        </p:style>
+      </p:cxnSp>
+      <p:cxnSp>
+        <p:nvCxnSpPr>
+          <p:cNvPr id="13" name="Straight Arrow Connector 12">
+            <a:extLst>
+              <a:ext uri="{FF2B5EF4-FFF2-40B4-BE49-F238E27FC236}">
+                <a16:creationId xmlns:a16="http://schemas.microsoft.com/office/drawing/2014/main" id="{25C1EA53-0087-E6C1-0947-9058A140BFD2}"/>
+              </a:ext>
+            </a:extLst>
+          </p:cNvPr>
+          <p:cNvCxnSpPr>
+            <a:cxnSpLocks/>
+          </p:cNvCxnSpPr>
+          <p:nvPr/>
+        </p:nvCxnSpPr>
+        <p:spPr>
+          <a:xfrm flipH="1">
+            <a:off x="8682268" y="3890276"/>
+            <a:ext cx="1198538" cy="0"/>
+          </a:xfrm>
+          <a:prstGeom prst="straightConnector1">
+            <a:avLst/>
+          </a:prstGeom>
+          <a:ln>
+            <a:tailEnd type="triangle"/>
+          </a:ln>
+        </p:spPr>
+        <p:style>
+          <a:lnRef idx="2">
+            <a:schemeClr val="dk1"/>
+          </a:lnRef>
+          <a:fillRef idx="0">
+            <a:schemeClr val="dk1"/>
+          </a:fillRef>
+          <a:effectRef idx="1">
+            <a:schemeClr val="dk1"/>
+          </a:effectRef>
+          <a:fontRef idx="minor">
+            <a:schemeClr val="tx1"/>
+          </a:fontRef>
+        </p:style>
+      </p:cxnSp>
+      <p:cxnSp>
+        <p:nvCxnSpPr>
+          <p:cNvPr id="16" name="Straight Arrow Connector 15">
+            <a:extLst>
+              <a:ext uri="{FF2B5EF4-FFF2-40B4-BE49-F238E27FC236}">
+                <a16:creationId xmlns:a16="http://schemas.microsoft.com/office/drawing/2014/main" id="{29FC000C-5E32-E18E-1E5D-5608FD30A939}"/>
+              </a:ext>
+            </a:extLst>
+          </p:cNvPr>
+          <p:cNvCxnSpPr>
+            <a:cxnSpLocks/>
+          </p:cNvCxnSpPr>
+          <p:nvPr/>
+        </p:nvCxnSpPr>
+        <p:spPr>
+          <a:xfrm>
+            <a:off x="8702634" y="3998371"/>
+            <a:ext cx="1198538" cy="0"/>
+          </a:xfrm>
+          <a:prstGeom prst="straightConnector1">
+            <a:avLst/>
+          </a:prstGeom>
+          <a:ln>
+            <a:tailEnd type="triangle"/>
+          </a:ln>
+        </p:spPr>
+        <p:style>
+          <a:lnRef idx="2">
+            <a:schemeClr val="dk1"/>
+          </a:lnRef>
+          <a:fillRef idx="0">
+            <a:schemeClr val="dk1"/>
+          </a:fillRef>
+          <a:effectRef idx="1">
+            <a:schemeClr val="dk1"/>
+          </a:effectRef>
+          <a:fontRef idx="minor">
+            <a:schemeClr val="tx1"/>
+          </a:fontRef>
+        </p:style>
+      </p:cxnSp>
+      <p:cxnSp>
+        <p:nvCxnSpPr>
+          <p:cNvPr id="20" name="Straight Arrow Connector 19">
+            <a:extLst>
+              <a:ext uri="{FF2B5EF4-FFF2-40B4-BE49-F238E27FC236}">
+                <a16:creationId xmlns:a16="http://schemas.microsoft.com/office/drawing/2014/main" id="{F52D6DF4-1911-45DA-4273-0DFCFE2A7B38}"/>
+              </a:ext>
+            </a:extLst>
+          </p:cNvPr>
+          <p:cNvCxnSpPr>
+            <a:cxnSpLocks/>
+          </p:cNvCxnSpPr>
+          <p:nvPr/>
+        </p:nvCxnSpPr>
+        <p:spPr>
+          <a:xfrm flipH="1">
+            <a:off x="4968951" y="5621185"/>
+            <a:ext cx="727680" cy="0"/>
+          </a:xfrm>
+          <a:prstGeom prst="straightConnector1">
+            <a:avLst/>
+          </a:prstGeom>
+          <a:ln>
+            <a:tailEnd type="triangle"/>
+          </a:ln>
+        </p:spPr>
+        <p:style>
+          <a:lnRef idx="2">
+            <a:schemeClr val="dk1"/>
+          </a:lnRef>
+          <a:fillRef idx="0">
+            <a:schemeClr val="dk1"/>
+          </a:fillRef>
+          <a:effectRef idx="1">
+            <a:schemeClr val="dk1"/>
+          </a:effectRef>
+          <a:fontRef idx="minor">
+            <a:schemeClr val="tx1"/>
+          </a:fontRef>
+        </p:style>
+      </p:cxnSp>
+      <p:pic>
+        <p:nvPicPr>
+          <p:cNvPr id="6" name="Picture 5">
+            <a:extLst>
+              <a:ext uri="{FF2B5EF4-FFF2-40B4-BE49-F238E27FC236}">
+                <a16:creationId xmlns:a16="http://schemas.microsoft.com/office/drawing/2014/main" id="{E1144543-9961-720A-7469-E36E7CD4C20B}"/>
+              </a:ext>
+            </a:extLst>
+          </p:cNvPr>
+          <p:cNvPicPr>
+            <a:picLocks noChangeAspect="1"/>
+          </p:cNvPicPr>
+          <p:nvPr/>
+        </p:nvPicPr>
+        <p:blipFill>
+          <a:blip r:embed="rId8"/>
+          <a:stretch>
+            <a:fillRect/>
+          </a:stretch>
+        </p:blipFill>
+        <p:spPr>
+          <a:xfrm>
+            <a:off x="5697387" y="5111425"/>
+            <a:ext cx="2444211" cy="1181369"/>
+          </a:xfrm>
+          <a:prstGeom prst="rect">
+            <a:avLst/>
+          </a:prstGeom>
+        </p:spPr>
+      </p:pic>
+      <p:cxnSp>
+        <p:nvCxnSpPr>
+          <p:cNvPr id="11" name="Straight Arrow Connector 10">
+            <a:extLst>
+              <a:ext uri="{FF2B5EF4-FFF2-40B4-BE49-F238E27FC236}">
+                <a16:creationId xmlns:a16="http://schemas.microsoft.com/office/drawing/2014/main" id="{75A56610-2014-2CC8-9114-D27806C60ABC}"/>
+              </a:ext>
+            </a:extLst>
+          </p:cNvPr>
+          <p:cNvCxnSpPr>
+            <a:cxnSpLocks/>
+          </p:cNvCxnSpPr>
+          <p:nvPr/>
+        </p:nvCxnSpPr>
+        <p:spPr>
+          <a:xfrm flipH="1">
+            <a:off x="8137430" y="5622216"/>
+            <a:ext cx="328305" cy="0"/>
+          </a:xfrm>
+          <a:prstGeom prst="straightConnector1">
+            <a:avLst/>
+          </a:prstGeom>
+          <a:ln>
+            <a:tailEnd type="triangle"/>
+          </a:ln>
+        </p:spPr>
+        <p:style>
+          <a:lnRef idx="2">
+            <a:schemeClr val="dk1"/>
+          </a:lnRef>
+          <a:fillRef idx="0">
+            <a:schemeClr val="dk1"/>
+          </a:fillRef>
+          <a:effectRef idx="1">
+            <a:schemeClr val="dk1"/>
+          </a:effectRef>
+          <a:fontRef idx="minor">
+            <a:schemeClr val="tx1"/>
+          </a:fontRef>
+        </p:style>
+      </p:cxnSp>
+      <p:sp>
+        <p:nvSpPr>
+          <p:cNvPr id="15" name="TextBox 14">
+            <a:extLst>
+              <a:ext uri="{FF2B5EF4-FFF2-40B4-BE49-F238E27FC236}">
+                <a16:creationId xmlns:a16="http://schemas.microsoft.com/office/drawing/2014/main" id="{2B3DB30C-A578-4FE5-4569-BEB1647D5ABC}"/>
+              </a:ext>
+            </a:extLst>
+          </p:cNvPr>
+          <p:cNvSpPr txBox="1"/>
+          <p:nvPr/>
+        </p:nvSpPr>
+        <p:spPr>
+          <a:xfrm>
+            <a:off x="5620643" y="4845407"/>
+            <a:ext cx="919739" cy="338554"/>
+          </a:xfrm>
+          <a:prstGeom prst="rect">
+            <a:avLst/>
+          </a:prstGeom>
+          <a:noFill/>
+        </p:spPr>
+        <p:txBody>
+          <a:bodyPr wrap="none" rtlCol="0">
+            <a:spAutoFit/>
+          </a:bodyPr>
+          <a:lstStyle/>
+          <a:p>
+            <a:r>
+              <a:rPr lang="en-US" sz="1600" dirty="0"/>
+              <a:t>Habit list</a:t>
+            </a:r>
+          </a:p>
+        </p:txBody>
+      </p:sp>
+      <p:pic>
+        <p:nvPicPr>
+          <p:cNvPr id="18" name="Picture 17">
+            <a:extLst>
+              <a:ext uri="{FF2B5EF4-FFF2-40B4-BE49-F238E27FC236}">
+                <a16:creationId xmlns:a16="http://schemas.microsoft.com/office/drawing/2014/main" id="{D9C9208C-F960-1EF4-E0A0-E9E20EDE94E6}"/>
+              </a:ext>
+            </a:extLst>
+          </p:cNvPr>
+          <p:cNvPicPr>
+            <a:picLocks noChangeAspect="1"/>
+          </p:cNvPicPr>
+          <p:nvPr/>
+        </p:nvPicPr>
+        <p:blipFill>
+          <a:blip r:embed="rId9"/>
+          <a:stretch>
+            <a:fillRect/>
+          </a:stretch>
+        </p:blipFill>
+        <p:spPr>
+          <a:xfrm>
+            <a:off x="1812965" y="4860332"/>
+            <a:ext cx="3155986" cy="1926507"/>
+          </a:xfrm>
+          <a:prstGeom prst="rect">
+            <a:avLst/>
+          </a:prstGeom>
+        </p:spPr>
+      </p:pic>
+      <p:cxnSp>
+        <p:nvCxnSpPr>
+          <p:cNvPr id="38" name="Straight Arrow Connector 37">
+            <a:extLst>
+              <a:ext uri="{FF2B5EF4-FFF2-40B4-BE49-F238E27FC236}">
+                <a16:creationId xmlns:a16="http://schemas.microsoft.com/office/drawing/2014/main" id="{C1D8A86E-E293-9BE6-702C-DC2766258F34}"/>
+              </a:ext>
+            </a:extLst>
+          </p:cNvPr>
+          <p:cNvCxnSpPr>
+            <a:cxnSpLocks/>
+          </p:cNvCxnSpPr>
+          <p:nvPr/>
+        </p:nvCxnSpPr>
+        <p:spPr>
+          <a:xfrm>
+            <a:off x="8040665" y="2976969"/>
+            <a:ext cx="0" cy="402142"/>
+          </a:xfrm>
+          <a:prstGeom prst="straightConnector1">
+            <a:avLst/>
+          </a:prstGeom>
+          <a:ln>
+            <a:tailEnd type="triangle"/>
+          </a:ln>
+        </p:spPr>
+        <p:style>
+          <a:lnRef idx="2">
+            <a:schemeClr val="dk1"/>
+          </a:lnRef>
+          <a:fillRef idx="0">
+            <a:schemeClr val="dk1"/>
+          </a:fillRef>
+          <a:effectRef idx="1">
+            <a:schemeClr val="dk1"/>
+          </a:effectRef>
+          <a:fontRef idx="minor">
+            <a:schemeClr val="tx1"/>
+          </a:fontRef>
+        </p:style>
+      </p:cxnSp>
+      <p:cxnSp>
+        <p:nvCxnSpPr>
+          <p:cNvPr id="46" name="Straight Arrow Connector 45">
+            <a:extLst>
+              <a:ext uri="{FF2B5EF4-FFF2-40B4-BE49-F238E27FC236}">
+                <a16:creationId xmlns:a16="http://schemas.microsoft.com/office/drawing/2014/main" id="{CA8375DF-2B23-0C2D-173C-7B8DCC58B6D9}"/>
+              </a:ext>
+            </a:extLst>
+          </p:cNvPr>
+          <p:cNvCxnSpPr>
+            <a:cxnSpLocks/>
+          </p:cNvCxnSpPr>
+          <p:nvPr/>
+        </p:nvCxnSpPr>
+        <p:spPr>
+          <a:xfrm flipH="1">
+            <a:off x="5042104" y="3867964"/>
+            <a:ext cx="1473186" cy="0"/>
+          </a:xfrm>
+          <a:prstGeom prst="straightConnector1">
+            <a:avLst/>
+          </a:prstGeom>
+          <a:ln>
+            <a:tailEnd type="triangle"/>
+          </a:ln>
+        </p:spPr>
+        <p:style>
+          <a:lnRef idx="2">
+            <a:schemeClr val="dk1"/>
+          </a:lnRef>
+          <a:fillRef idx="0">
+            <a:schemeClr val="dk1"/>
+          </a:fillRef>
+          <a:effectRef idx="1">
+            <a:schemeClr val="dk1"/>
+          </a:effectRef>
+          <a:fontRef idx="minor">
+            <a:schemeClr val="tx1"/>
+          </a:fontRef>
+        </p:style>
+      </p:cxnSp>
+      <p:cxnSp>
+        <p:nvCxnSpPr>
+          <p:cNvPr id="65" name="Straight Arrow Connector 64">
+            <a:extLst>
+              <a:ext uri="{FF2B5EF4-FFF2-40B4-BE49-F238E27FC236}">
+                <a16:creationId xmlns:a16="http://schemas.microsoft.com/office/drawing/2014/main" id="{52A72F3F-1509-D8A1-32E2-F9BBDA407BA2}"/>
+              </a:ext>
+            </a:extLst>
+          </p:cNvPr>
+          <p:cNvCxnSpPr>
+            <a:cxnSpLocks/>
+          </p:cNvCxnSpPr>
+          <p:nvPr/>
+        </p:nvCxnSpPr>
+        <p:spPr>
+          <a:xfrm>
+            <a:off x="5063407" y="3998371"/>
+            <a:ext cx="1476975" cy="0"/>
+          </a:xfrm>
+          <a:prstGeom prst="straightConnector1">
+            <a:avLst/>
+          </a:prstGeom>
+          <a:ln>
+            <a:tailEnd type="triangle"/>
+          </a:ln>
+        </p:spPr>
+        <p:style>
+          <a:lnRef idx="2">
+            <a:schemeClr val="dk1"/>
+          </a:lnRef>
+          <a:fillRef idx="0">
+            <a:schemeClr val="dk1"/>
+          </a:fillRef>
+          <a:effectRef idx="1">
+            <a:schemeClr val="dk1"/>
+          </a:effectRef>
+          <a:fontRef idx="minor">
+            <a:schemeClr val="tx1"/>
+          </a:fontRef>
+        </p:style>
+      </p:cxnSp>
+      <p:cxnSp>
+        <p:nvCxnSpPr>
+          <p:cNvPr id="67" name="Straight Arrow Connector 66">
+            <a:extLst>
+              <a:ext uri="{FF2B5EF4-FFF2-40B4-BE49-F238E27FC236}">
+                <a16:creationId xmlns:a16="http://schemas.microsoft.com/office/drawing/2014/main" id="{F0C506D2-10D3-0519-3832-3A9F9843C24C}"/>
+              </a:ext>
+            </a:extLst>
+          </p:cNvPr>
+          <p:cNvCxnSpPr>
+            <a:cxnSpLocks/>
+          </p:cNvCxnSpPr>
+          <p:nvPr/>
+        </p:nvCxnSpPr>
+        <p:spPr>
+          <a:xfrm>
+            <a:off x="4948555" y="6526825"/>
+            <a:ext cx="3517180" cy="0"/>
+          </a:xfrm>
+          <a:prstGeom prst="straightConnector1">
+            <a:avLst/>
+          </a:prstGeom>
+          <a:ln>
+            <a:tailEnd type="triangle"/>
+          </a:ln>
+        </p:spPr>
+        <p:style>
+          <a:lnRef idx="2">
+            <a:schemeClr val="dk1"/>
+          </a:lnRef>
+          <a:fillRef idx="0">
+            <a:schemeClr val="dk1"/>
+          </a:fillRef>
+          <a:effectRef idx="1">
+            <a:schemeClr val="dk1"/>
+          </a:effectRef>
+          <a:fontRef idx="minor">
+            <a:schemeClr val="tx1"/>
+          </a:fontRef>
+        </p:style>
+      </p:cxnSp>
+      <p:cxnSp>
+        <p:nvCxnSpPr>
+          <p:cNvPr id="70" name="Connector: Elbow 69">
+            <a:extLst>
+              <a:ext uri="{FF2B5EF4-FFF2-40B4-BE49-F238E27FC236}">
+                <a16:creationId xmlns:a16="http://schemas.microsoft.com/office/drawing/2014/main" id="{1C22848F-22C0-E519-C244-0CE113C5BEBD}"/>
+              </a:ext>
+            </a:extLst>
+          </p:cNvPr>
+          <p:cNvCxnSpPr>
+            <a:cxnSpLocks/>
+          </p:cNvCxnSpPr>
+          <p:nvPr/>
+        </p:nvCxnSpPr>
+        <p:spPr>
+          <a:xfrm rot="10800000">
+            <a:off x="8702634" y="4483049"/>
+            <a:ext cx="1627062" cy="897408"/>
+          </a:xfrm>
+          <a:prstGeom prst="bentConnector3">
+            <a:avLst>
+              <a:gd name="adj1" fmla="val 4019"/>
             </a:avLst>
           </a:prstGeom>
           <a:ln>
@@ -18354,23 +19124,22 @@
       </p:cxnSp>
       <p:cxnSp>
         <p:nvCxnSpPr>
-          <p:cNvPr id="45" name="Connector: Elbow 44">
+          <p:cNvPr id="76" name="Connector: Elbow 75">
             <a:extLst>
               <a:ext uri="{FF2B5EF4-FFF2-40B4-BE49-F238E27FC236}">
-                <a16:creationId xmlns:a16="http://schemas.microsoft.com/office/drawing/2014/main" id="{0C4FE8F2-3175-3090-C188-A18F32DD9853}"/>
+                <a16:creationId xmlns:a16="http://schemas.microsoft.com/office/drawing/2014/main" id="{F537DC9F-AF06-652C-4C41-DD5DDE609884}"/>
               </a:ext>
             </a:extLst>
           </p:cNvPr>
           <p:cNvCxnSpPr>
             <a:cxnSpLocks/>
-            <a:endCxn id="21" idx="3"/>
           </p:cNvCxnSpPr>
           <p:nvPr/>
         </p:nvCxnSpPr>
         <p:spPr>
           <a:xfrm rot="10800000">
-            <a:off x="8059935" y="3748766"/>
-            <a:ext cx="1524666" cy="210377"/>
+            <a:off x="5442358" y="2824118"/>
+            <a:ext cx="1093088" cy="782718"/>
           </a:xfrm>
           <a:prstGeom prst="bentConnector3">
             <a:avLst>
@@ -18396,514 +19165,6 @@
           </a:fontRef>
         </p:style>
       </p:cxnSp>
-      <p:cxnSp>
-        <p:nvCxnSpPr>
-          <p:cNvPr id="54" name="Connector: Elbow 53">
-            <a:extLst>
-              <a:ext uri="{FF2B5EF4-FFF2-40B4-BE49-F238E27FC236}">
-                <a16:creationId xmlns:a16="http://schemas.microsoft.com/office/drawing/2014/main" id="{94738F2F-DBF8-7DDB-600E-AB6BC55B54E2}"/>
-              </a:ext>
-            </a:extLst>
-          </p:cNvPr>
-          <p:cNvCxnSpPr>
-            <a:cxnSpLocks/>
-            <a:stCxn id="21" idx="1"/>
-            <a:endCxn id="25" idx="3"/>
-          </p:cNvCxnSpPr>
-          <p:nvPr/>
-        </p:nvCxnSpPr>
-        <p:spPr>
-          <a:xfrm rot="10800000">
-            <a:off x="4587530" y="3710557"/>
-            <a:ext cx="1621259" cy="38208"/>
-          </a:xfrm>
-          <a:prstGeom prst="bentConnector3">
-            <a:avLst>
-              <a:gd name="adj1" fmla="val 50000"/>
-            </a:avLst>
-          </a:prstGeom>
-          <a:ln>
-            <a:tailEnd type="triangle"/>
-          </a:ln>
-        </p:spPr>
-        <p:style>
-          <a:lnRef idx="2">
-            <a:schemeClr val="dk1"/>
-          </a:lnRef>
-          <a:fillRef idx="0">
-            <a:schemeClr val="dk1"/>
-          </a:fillRef>
-          <a:effectRef idx="1">
-            <a:schemeClr val="dk1"/>
-          </a:effectRef>
-          <a:fontRef idx="minor">
-            <a:schemeClr val="tx1"/>
-          </a:fontRef>
-        </p:style>
-      </p:cxnSp>
-      <p:cxnSp>
-        <p:nvCxnSpPr>
-          <p:cNvPr id="82" name="Connector: Elbow 81">
-            <a:extLst>
-              <a:ext uri="{FF2B5EF4-FFF2-40B4-BE49-F238E27FC236}">
-                <a16:creationId xmlns:a16="http://schemas.microsoft.com/office/drawing/2014/main" id="{6D3F85DF-C0EA-2A29-D39E-0E5EF60E38C0}"/>
-              </a:ext>
-            </a:extLst>
-          </p:cNvPr>
-          <p:cNvCxnSpPr>
-            <a:cxnSpLocks/>
-          </p:cNvCxnSpPr>
-          <p:nvPr/>
-        </p:nvCxnSpPr>
-        <p:spPr>
-          <a:xfrm>
-            <a:off x="3212522" y="4075751"/>
-            <a:ext cx="6282851" cy="304958"/>
-          </a:xfrm>
-          <a:prstGeom prst="bentConnector3">
-            <a:avLst>
-              <a:gd name="adj1" fmla="val -29"/>
-            </a:avLst>
-          </a:prstGeom>
-          <a:ln>
-            <a:tailEnd type="triangle"/>
-          </a:ln>
-        </p:spPr>
-        <p:style>
-          <a:lnRef idx="2">
-            <a:schemeClr val="dk1"/>
-          </a:lnRef>
-          <a:fillRef idx="0">
-            <a:schemeClr val="dk1"/>
-          </a:fillRef>
-          <a:effectRef idx="1">
-            <a:schemeClr val="dk1"/>
-          </a:effectRef>
-          <a:fontRef idx="minor">
-            <a:schemeClr val="tx1"/>
-          </a:fontRef>
-        </p:style>
-      </p:cxnSp>
-      <p:cxnSp>
-        <p:nvCxnSpPr>
-          <p:cNvPr id="119" name="Connector: Elbow 118">
-            <a:extLst>
-              <a:ext uri="{FF2B5EF4-FFF2-40B4-BE49-F238E27FC236}">
-                <a16:creationId xmlns:a16="http://schemas.microsoft.com/office/drawing/2014/main" id="{9CDF55C7-009C-04F8-4225-D7A80433D01C}"/>
-              </a:ext>
-            </a:extLst>
-          </p:cNvPr>
-          <p:cNvCxnSpPr>
-            <a:cxnSpLocks/>
-            <a:stCxn id="31" idx="3"/>
-            <a:endCxn id="33" idx="1"/>
-          </p:cNvCxnSpPr>
-          <p:nvPr/>
-        </p:nvCxnSpPr>
-        <p:spPr>
-          <a:xfrm>
-            <a:off x="5004790" y="2490328"/>
-            <a:ext cx="357784" cy="15168"/>
-          </a:xfrm>
-          <a:prstGeom prst="bentConnector3">
-            <a:avLst>
-              <a:gd name="adj1" fmla="val 50000"/>
-            </a:avLst>
-          </a:prstGeom>
-          <a:ln>
-            <a:tailEnd type="triangle"/>
-          </a:ln>
-        </p:spPr>
-        <p:style>
-          <a:lnRef idx="2">
-            <a:schemeClr val="dk1"/>
-          </a:lnRef>
-          <a:fillRef idx="0">
-            <a:schemeClr val="dk1"/>
-          </a:fillRef>
-          <a:effectRef idx="1">
-            <a:schemeClr val="dk1"/>
-          </a:effectRef>
-          <a:fontRef idx="minor">
-            <a:schemeClr val="tx1"/>
-          </a:fontRef>
-        </p:style>
-      </p:cxnSp>
-      <p:cxnSp>
-        <p:nvCxnSpPr>
-          <p:cNvPr id="122" name="Connector: Elbow 121">
-            <a:extLst>
-              <a:ext uri="{FF2B5EF4-FFF2-40B4-BE49-F238E27FC236}">
-                <a16:creationId xmlns:a16="http://schemas.microsoft.com/office/drawing/2014/main" id="{23C7872C-B0CF-8961-A2D2-075DF2EBF9D1}"/>
-              </a:ext>
-            </a:extLst>
-          </p:cNvPr>
-          <p:cNvCxnSpPr>
-            <a:cxnSpLocks/>
-            <a:stCxn id="35" idx="2"/>
-            <a:endCxn id="27" idx="3"/>
-          </p:cNvCxnSpPr>
-          <p:nvPr/>
-        </p:nvCxnSpPr>
-        <p:spPr>
-          <a:xfrm rot="5400000">
-            <a:off x="9792320" y="5194644"/>
-            <a:ext cx="1219653" cy="355521"/>
-          </a:xfrm>
-          <a:prstGeom prst="bentConnector2">
-            <a:avLst/>
-          </a:prstGeom>
-          <a:ln>
-            <a:tailEnd type="triangle"/>
-          </a:ln>
-        </p:spPr>
-        <p:style>
-          <a:lnRef idx="2">
-            <a:schemeClr val="dk1"/>
-          </a:lnRef>
-          <a:fillRef idx="0">
-            <a:schemeClr val="dk1"/>
-          </a:fillRef>
-          <a:effectRef idx="1">
-            <a:schemeClr val="dk1"/>
-          </a:effectRef>
-          <a:fontRef idx="minor">
-            <a:schemeClr val="tx1"/>
-          </a:fontRef>
-        </p:style>
-      </p:cxnSp>
-      <p:cxnSp>
-        <p:nvCxnSpPr>
-          <p:cNvPr id="135" name="Connector: Elbow 134">
-            <a:extLst>
-              <a:ext uri="{FF2B5EF4-FFF2-40B4-BE49-F238E27FC236}">
-                <a16:creationId xmlns:a16="http://schemas.microsoft.com/office/drawing/2014/main" id="{06945224-A8A1-D2D0-4AA6-B20D4BC5B4DF}"/>
-              </a:ext>
-            </a:extLst>
-          </p:cNvPr>
-          <p:cNvCxnSpPr>
-            <a:cxnSpLocks/>
-            <a:stCxn id="27" idx="1"/>
-            <a:endCxn id="29" idx="3"/>
-          </p:cNvCxnSpPr>
-          <p:nvPr/>
-        </p:nvCxnSpPr>
-        <p:spPr>
-          <a:xfrm rot="10800000">
-            <a:off x="4971219" y="5841251"/>
-            <a:ext cx="1966583" cy="140981"/>
-          </a:xfrm>
-          <a:prstGeom prst="bentConnector3">
-            <a:avLst>
-              <a:gd name="adj1" fmla="val 50000"/>
-            </a:avLst>
-          </a:prstGeom>
-          <a:ln>
-            <a:tailEnd type="triangle"/>
-          </a:ln>
-        </p:spPr>
-        <p:style>
-          <a:lnRef idx="2">
-            <a:schemeClr val="dk1"/>
-          </a:lnRef>
-          <a:fillRef idx="0">
-            <a:schemeClr val="dk1"/>
-          </a:fillRef>
-          <a:effectRef idx="1">
-            <a:schemeClr val="dk1"/>
-          </a:effectRef>
-          <a:fontRef idx="minor">
-            <a:schemeClr val="tx1"/>
-          </a:fontRef>
-        </p:style>
-      </p:cxnSp>
-      <p:cxnSp>
-        <p:nvCxnSpPr>
-          <p:cNvPr id="144" name="Connector: Elbow 143">
-            <a:extLst>
-              <a:ext uri="{FF2B5EF4-FFF2-40B4-BE49-F238E27FC236}">
-                <a16:creationId xmlns:a16="http://schemas.microsoft.com/office/drawing/2014/main" id="{A3D13B2F-8C40-7E39-2330-0EF1610A1CC6}"/>
-              </a:ext>
-            </a:extLst>
-          </p:cNvPr>
-          <p:cNvCxnSpPr>
-            <a:cxnSpLocks/>
-            <a:stCxn id="29" idx="0"/>
-          </p:cNvCxnSpPr>
-          <p:nvPr/>
-        </p:nvCxnSpPr>
-        <p:spPr>
-          <a:xfrm rot="5400000" flipH="1" flipV="1">
-            <a:off x="6115399" y="1476248"/>
-            <a:ext cx="477096" cy="6282851"/>
-          </a:xfrm>
-          <a:prstGeom prst="bentConnector2">
-            <a:avLst/>
-          </a:prstGeom>
-          <a:ln>
-            <a:tailEnd type="triangle"/>
-          </a:ln>
-        </p:spPr>
-        <p:style>
-          <a:lnRef idx="2">
-            <a:schemeClr val="dk1"/>
-          </a:lnRef>
-          <a:fillRef idx="0">
-            <a:schemeClr val="dk1"/>
-          </a:fillRef>
-          <a:effectRef idx="1">
-            <a:schemeClr val="dk1"/>
-          </a:effectRef>
-          <a:fontRef idx="minor">
-            <a:schemeClr val="tx1"/>
-          </a:fontRef>
-        </p:style>
-      </p:cxnSp>
-      <p:sp>
-        <p:nvSpPr>
-          <p:cNvPr id="162" name="TextBox 161">
-            <a:extLst>
-              <a:ext uri="{FF2B5EF4-FFF2-40B4-BE49-F238E27FC236}">
-                <a16:creationId xmlns:a16="http://schemas.microsoft.com/office/drawing/2014/main" id="{621095E8-C57D-5C90-9103-A539067B800C}"/>
-              </a:ext>
-            </a:extLst>
-          </p:cNvPr>
-          <p:cNvSpPr txBox="1"/>
-          <p:nvPr/>
-        </p:nvSpPr>
-        <p:spPr>
-          <a:xfrm>
-            <a:off x="9366963" y="3049468"/>
-            <a:ext cx="1127232" cy="338554"/>
-          </a:xfrm>
-          <a:prstGeom prst="rect">
-            <a:avLst/>
-          </a:prstGeom>
-          <a:noFill/>
-        </p:spPr>
-        <p:txBody>
-          <a:bodyPr wrap="none" rtlCol="0">
-            <a:spAutoFit/>
-          </a:bodyPr>
-          <a:lstStyle/>
-          <a:p>
-            <a:r>
-              <a:rPr lang="en-US" sz="1600" dirty="0"/>
-              <a:t>main menu</a:t>
-            </a:r>
-          </a:p>
-        </p:txBody>
-      </p:sp>
-      <p:sp>
-        <p:nvSpPr>
-          <p:cNvPr id="168" name="TextBox 167">
-            <a:extLst>
-              <a:ext uri="{FF2B5EF4-FFF2-40B4-BE49-F238E27FC236}">
-                <a16:creationId xmlns:a16="http://schemas.microsoft.com/office/drawing/2014/main" id="{5F9AD5B6-70D8-9DBF-DB0B-CB6843B24448}"/>
-              </a:ext>
-            </a:extLst>
-          </p:cNvPr>
-          <p:cNvSpPr txBox="1"/>
-          <p:nvPr/>
-        </p:nvSpPr>
-        <p:spPr>
-          <a:xfrm>
-            <a:off x="6876757" y="5001725"/>
-            <a:ext cx="1437638" cy="338554"/>
-          </a:xfrm>
-          <a:prstGeom prst="rect">
-            <a:avLst/>
-          </a:prstGeom>
-          <a:noFill/>
-        </p:spPr>
-        <p:txBody>
-          <a:bodyPr wrap="none" rtlCol="0">
-            <a:spAutoFit/>
-          </a:bodyPr>
-          <a:lstStyle/>
-          <a:p>
-            <a:r>
-              <a:rPr lang="en-US" sz="1600" dirty="0"/>
-              <a:t>analytics menu</a:t>
-            </a:r>
-          </a:p>
-        </p:txBody>
-      </p:sp>
-      <p:sp>
-        <p:nvSpPr>
-          <p:cNvPr id="170" name="TextBox 169">
-            <a:extLst>
-              <a:ext uri="{FF2B5EF4-FFF2-40B4-BE49-F238E27FC236}">
-                <a16:creationId xmlns:a16="http://schemas.microsoft.com/office/drawing/2014/main" id="{06DE68C7-E2F9-11DD-8569-0A51AD5444CF}"/>
-              </a:ext>
-            </a:extLst>
-          </p:cNvPr>
-          <p:cNvSpPr txBox="1"/>
-          <p:nvPr/>
-        </p:nvSpPr>
-        <p:spPr>
-          <a:xfrm>
-            <a:off x="1386682" y="4535417"/>
-            <a:ext cx="1542410" cy="338554"/>
-          </a:xfrm>
-          <a:prstGeom prst="rect">
-            <a:avLst/>
-          </a:prstGeom>
-          <a:noFill/>
-        </p:spPr>
-        <p:txBody>
-          <a:bodyPr wrap="none" rtlCol="0">
-            <a:spAutoFit/>
-          </a:bodyPr>
-          <a:lstStyle/>
-          <a:p>
-            <a:r>
-              <a:rPr lang="en-US" sz="1600" dirty="0"/>
-              <a:t>Habit inspection</a:t>
-            </a:r>
-          </a:p>
-        </p:txBody>
-      </p:sp>
-      <p:sp>
-        <p:nvSpPr>
-          <p:cNvPr id="175" name="TextBox 174">
-            <a:extLst>
-              <a:ext uri="{FF2B5EF4-FFF2-40B4-BE49-F238E27FC236}">
-                <a16:creationId xmlns:a16="http://schemas.microsoft.com/office/drawing/2014/main" id="{9D32B05A-A434-E694-26EF-A181CC9B4D53}"/>
-              </a:ext>
-            </a:extLst>
-          </p:cNvPr>
-          <p:cNvSpPr txBox="1"/>
-          <p:nvPr/>
-        </p:nvSpPr>
-        <p:spPr>
-          <a:xfrm>
-            <a:off x="6118536" y="2929832"/>
-            <a:ext cx="1345433" cy="338554"/>
-          </a:xfrm>
-          <a:prstGeom prst="rect">
-            <a:avLst/>
-          </a:prstGeom>
-          <a:noFill/>
-        </p:spPr>
-        <p:txBody>
-          <a:bodyPr wrap="none" rtlCol="0">
-            <a:spAutoFit/>
-          </a:bodyPr>
-          <a:lstStyle/>
-          <a:p>
-            <a:r>
-              <a:rPr lang="en-US" sz="1600" dirty="0"/>
-              <a:t>habit creation</a:t>
-            </a:r>
-          </a:p>
-        </p:txBody>
-      </p:sp>
-      <p:sp>
-        <p:nvSpPr>
-          <p:cNvPr id="177" name="TextBox 176">
-            <a:extLst>
-              <a:ext uri="{FF2B5EF4-FFF2-40B4-BE49-F238E27FC236}">
-                <a16:creationId xmlns:a16="http://schemas.microsoft.com/office/drawing/2014/main" id="{28B22B98-943D-4128-1099-69F3650B81E4}"/>
-              </a:ext>
-            </a:extLst>
-          </p:cNvPr>
-          <p:cNvSpPr txBox="1"/>
-          <p:nvPr/>
-        </p:nvSpPr>
-        <p:spPr>
-          <a:xfrm>
-            <a:off x="1280887" y="3058054"/>
-            <a:ext cx="878638" cy="307777"/>
-          </a:xfrm>
-          <a:prstGeom prst="rect">
-            <a:avLst/>
-          </a:prstGeom>
-          <a:noFill/>
-        </p:spPr>
-        <p:txBody>
-          <a:bodyPr wrap="none" rtlCol="0">
-            <a:spAutoFit/>
-          </a:bodyPr>
-          <a:lstStyle/>
-          <a:p>
-            <a:r>
-              <a:rPr lang="en-US" sz="1400" dirty="0"/>
-              <a:t>Check-off</a:t>
-            </a:r>
-          </a:p>
-        </p:txBody>
-      </p:sp>
-      <p:sp>
-        <p:nvSpPr>
-          <p:cNvPr id="187" name="TextBox 186">
-            <a:extLst>
-              <a:ext uri="{FF2B5EF4-FFF2-40B4-BE49-F238E27FC236}">
-                <a16:creationId xmlns:a16="http://schemas.microsoft.com/office/drawing/2014/main" id="{7D3BB3DC-E3D7-3B3D-CFAD-FE00D33A5ABD}"/>
-              </a:ext>
-            </a:extLst>
-          </p:cNvPr>
-          <p:cNvSpPr txBox="1"/>
-          <p:nvPr/>
-        </p:nvSpPr>
-        <p:spPr>
-          <a:xfrm>
-            <a:off x="1386682" y="1747012"/>
-            <a:ext cx="1390894" cy="307777"/>
-          </a:xfrm>
-          <a:prstGeom prst="rect">
-            <a:avLst/>
-          </a:prstGeom>
-          <a:noFill/>
-        </p:spPr>
-        <p:txBody>
-          <a:bodyPr wrap="none" rtlCol="0">
-            <a:spAutoFit/>
-          </a:bodyPr>
-          <a:lstStyle/>
-          <a:p>
-            <a:r>
-              <a:rPr lang="en-US" sz="1400" dirty="0"/>
-              <a:t>Welcome screen</a:t>
-            </a:r>
-          </a:p>
-        </p:txBody>
-      </p:sp>
-      <p:sp>
-        <p:nvSpPr>
-          <p:cNvPr id="188" name="TextBox 187">
-            <a:extLst>
-              <a:ext uri="{FF2B5EF4-FFF2-40B4-BE49-F238E27FC236}">
-                <a16:creationId xmlns:a16="http://schemas.microsoft.com/office/drawing/2014/main" id="{DE88E7CD-770D-A239-32D6-4E21165A0E3B}"/>
-              </a:ext>
-            </a:extLst>
-          </p:cNvPr>
-          <p:cNvSpPr txBox="1"/>
-          <p:nvPr/>
-        </p:nvSpPr>
-        <p:spPr>
-          <a:xfrm>
-            <a:off x="5259063" y="1722078"/>
-            <a:ext cx="542136" cy="307777"/>
-          </a:xfrm>
-          <a:prstGeom prst="rect">
-            <a:avLst/>
-          </a:prstGeom>
-          <a:noFill/>
-        </p:spPr>
-        <p:txBody>
-          <a:bodyPr wrap="none" rtlCol="0">
-            <a:spAutoFit/>
-          </a:bodyPr>
-          <a:lstStyle/>
-          <a:p>
-            <a:r>
-              <a:rPr lang="en-US" sz="1400" dirty="0"/>
-              <a:t>login</a:t>
-            </a:r>
-          </a:p>
-        </p:txBody>
-      </p:sp>
     </p:spTree>
     <p:extLst>
       <p:ext uri="{BB962C8B-B14F-4D97-AF65-F5344CB8AC3E}">
@@ -19081,7 +19342,7 @@
         <p:spPr>
           <a:xfrm>
             <a:off x="1802179" y="2072816"/>
-            <a:ext cx="9048750" cy="1477328"/>
+            <a:ext cx="9048750" cy="1754326"/>
           </a:xfrm>
           <a:prstGeom prst="rect">
             <a:avLst/>
@@ -19102,7 +19363,7 @@
           <a:p>
             <a:r>
               <a:rPr lang="en-US" dirty="0"/>
-              <a:t>• Check-off logging uses timestamps; history enables streak and trend analysis. </a:t>
+              <a:t>• Check-off logging uses timestamps; history enables streak. </a:t>
             </a:r>
           </a:p>
           <a:p>
@@ -19121,6 +19382,12 @@
             <a:r>
               <a:rPr lang="en-US" dirty="0"/>
               <a:t>• Write-through persistence: user actions are saved immediately.</a:t>
+            </a:r>
+          </a:p>
+          <a:p>
+            <a:r>
+              <a:rPr lang="en-US" dirty="0"/>
+              <a:t>• Authentication with SHA256 Hash and salt</a:t>
             </a:r>
           </a:p>
         </p:txBody>
@@ -19837,7 +20104,7 @@
         </p:blipFill>
         <p:spPr>
           <a:xfrm>
-            <a:off x="6876756" y="1950896"/>
+            <a:off x="6876757" y="1950896"/>
             <a:ext cx="4803929" cy="2232483"/>
           </a:xfrm>
           <a:prstGeom prst="rect">
@@ -19845,6 +20112,41 @@
           </a:prstGeom>
         </p:spPr>
       </p:pic>
+      <p:sp>
+        <p:nvSpPr>
+          <p:cNvPr id="3" name="TextBox 2">
+            <a:extLst>
+              <a:ext uri="{FF2B5EF4-FFF2-40B4-BE49-F238E27FC236}">
+                <a16:creationId xmlns:a16="http://schemas.microsoft.com/office/drawing/2014/main" id="{5888DC1A-F10F-23B0-4122-84A4D9795E20}"/>
+              </a:ext>
+            </a:extLst>
+          </p:cNvPr>
+          <p:cNvSpPr txBox="1"/>
+          <p:nvPr/>
+        </p:nvSpPr>
+        <p:spPr>
+          <a:xfrm>
+            <a:off x="6835699" y="4438113"/>
+            <a:ext cx="4014753" cy="369332"/>
+          </a:xfrm>
+          <a:prstGeom prst="rect">
+            <a:avLst/>
+          </a:prstGeom>
+          <a:noFill/>
+        </p:spPr>
+        <p:txBody>
+          <a:bodyPr wrap="none" rtlCol="0">
+            <a:spAutoFit/>
+          </a:bodyPr>
+          <a:lstStyle/>
+          <a:p>
+            <a:r>
+              <a:rPr lang="en-US" dirty="0"/>
+              <a:t>Full instructions available in README.md</a:t>
+            </a:r>
+          </a:p>
+        </p:txBody>
+      </p:sp>
     </p:spTree>
     <p:extLst>
       <p:ext uri="{BB962C8B-B14F-4D97-AF65-F5344CB8AC3E}">

</xml_diff>